<commit_message>
Update Project 1 - Intermediate presentation.pptx
</commit_message>
<xml_diff>
--- a/Doc/Project 1 - Intermediate presentation.pptx
+++ b/Doc/Project 1 - Intermediate presentation.pptx
@@ -6508,10 +6508,10 @@
       </p:sp>
       <p:pic>
         <p:nvPicPr>
-          <p:cNvPr id="4" name="Immagine 3" descr="Immagine che contiene diagramma, schermata, Diagramma, linea&#10;&#10;Il contenuto generato dall'IA potrebbe non essere corretto.">
-            <a:extLst>
-              <a:ext uri="{FF2B5EF4-FFF2-40B4-BE49-F238E27FC236}">
-                <a16:creationId xmlns:a16="http://schemas.microsoft.com/office/drawing/2014/main" id="{AA5EC92C-48A8-4564-70A3-B1422F5185B8}"/>
+          <p:cNvPr id="7" name="Immagine 6" descr="Immagine che contiene testo, schermata, diagramma, Diagramma&#10;&#10;Il contenuto generato dall'IA potrebbe non essere corretto.">
+            <a:extLst>
+              <a:ext uri="{FF2B5EF4-FFF2-40B4-BE49-F238E27FC236}">
+                <a16:creationId xmlns:a16="http://schemas.microsoft.com/office/drawing/2014/main" id="{9374B863-043A-F406-EFE8-65DF9487FBAC}"/>
               </a:ext>
             </a:extLst>
           </p:cNvPr>
@@ -6528,8 +6528,8 @@
         </p:blipFill>
         <p:spPr>
           <a:xfrm>
-            <a:off x="459350" y="1891970"/>
-            <a:ext cx="11391846" cy="4334874"/>
+            <a:off x="230356" y="1885279"/>
+            <a:ext cx="11530235" cy="4499813"/>
           </a:xfrm>
           <a:prstGeom prst="rect">
             <a:avLst/>
@@ -7007,41 +7007,6 @@
           </a:p>
         </p:txBody>
       </p:sp>
-      <p:pic>
-        <p:nvPicPr>
-          <p:cNvPr id="4" name="Immagine 3" descr="Immagine che contiene diagramma, Rettangolo, linea, schermata&#10;&#10;Il contenuto generato dall'IA potrebbe non essere corretto.">
-            <a:extLst>
-              <a:ext uri="{FF2B5EF4-FFF2-40B4-BE49-F238E27FC236}">
-                <a16:creationId xmlns:a16="http://schemas.microsoft.com/office/drawing/2014/main" id="{31BC2BF0-CB56-4247-8C1C-1F5669853792}"/>
-              </a:ext>
-            </a:extLst>
-          </p:cNvPr>
-          <p:cNvPicPr>
-            <a:picLocks noChangeAspect="1"/>
-          </p:cNvPicPr>
-          <p:nvPr/>
-        </p:nvPicPr>
-        <p:blipFill>
-          <a:blip r:embed="rId3"/>
-          <a:stretch>
-            <a:fillRect/>
-          </a:stretch>
-        </p:blipFill>
-        <p:spPr>
-          <a:xfrm>
-            <a:off x="255855" y="2025956"/>
-            <a:ext cx="11476599" cy="4367125"/>
-          </a:xfrm>
-          <a:prstGeom prst="rect">
-            <a:avLst/>
-          </a:prstGeom>
-          <a:ln>
-            <a:solidFill>
-              <a:schemeClr val="tx1"/>
-            </a:solidFill>
-          </a:ln>
-        </p:spPr>
-      </p:pic>
     </p:spTree>
     <p:extLst>
       <p:ext uri="{BB962C8B-B14F-4D97-AF65-F5344CB8AC3E}">

</xml_diff>

<commit_message>
Update boh di file
</commit_message>
<xml_diff>
--- a/Doc/Project 1 - Intermediate presentation.pptx
+++ b/Doc/Project 1 - Intermediate presentation.pptx
@@ -202,7 +202,7 @@
           <a:p>
             <a:fld id="{FBF2C009-1C0E-DD4B-99C5-35013CCE7DBF}" type="datetimeFigureOut">
               <a:rPr lang="it-IT" smtClean="0"/>
-              <a:t>10/04/25</a:t>
+              <a:t>11/04/25</a:t>
             </a:fld>
             <a:endParaRPr lang="it-IT"/>
           </a:p>
@@ -1195,7 +1195,7 @@
           <a:p>
             <a:fld id="{7C06B828-B815-F446-BC49-4CE521295E37}" type="datetimeFigureOut">
               <a:rPr lang="it-IT" smtClean="0"/>
-              <a:t>10/04/25</a:t>
+              <a:t>11/04/25</a:t>
             </a:fld>
             <a:endParaRPr lang="it-IT"/>
           </a:p>
@@ -1393,7 +1393,7 @@
           <a:p>
             <a:fld id="{7C06B828-B815-F446-BC49-4CE521295E37}" type="datetimeFigureOut">
               <a:rPr lang="it-IT" smtClean="0"/>
-              <a:t>10/04/25</a:t>
+              <a:t>11/04/25</a:t>
             </a:fld>
             <a:endParaRPr lang="it-IT"/>
           </a:p>
@@ -1601,7 +1601,7 @@
           <a:p>
             <a:fld id="{7C06B828-B815-F446-BC49-4CE521295E37}" type="datetimeFigureOut">
               <a:rPr lang="it-IT" smtClean="0"/>
-              <a:t>10/04/25</a:t>
+              <a:t>11/04/25</a:t>
             </a:fld>
             <a:endParaRPr lang="it-IT"/>
           </a:p>
@@ -1799,7 +1799,7 @@
           <a:p>
             <a:fld id="{7C06B828-B815-F446-BC49-4CE521295E37}" type="datetimeFigureOut">
               <a:rPr lang="it-IT" smtClean="0"/>
-              <a:t>10/04/25</a:t>
+              <a:t>11/04/25</a:t>
             </a:fld>
             <a:endParaRPr lang="it-IT"/>
           </a:p>
@@ -2074,7 +2074,7 @@
           <a:p>
             <a:fld id="{7C06B828-B815-F446-BC49-4CE521295E37}" type="datetimeFigureOut">
               <a:rPr lang="it-IT" smtClean="0"/>
-              <a:t>10/04/25</a:t>
+              <a:t>11/04/25</a:t>
             </a:fld>
             <a:endParaRPr lang="it-IT"/>
           </a:p>
@@ -2339,7 +2339,7 @@
           <a:p>
             <a:fld id="{7C06B828-B815-F446-BC49-4CE521295E37}" type="datetimeFigureOut">
               <a:rPr lang="it-IT" smtClean="0"/>
-              <a:t>10/04/25</a:t>
+              <a:t>11/04/25</a:t>
             </a:fld>
             <a:endParaRPr lang="it-IT"/>
           </a:p>
@@ -2751,7 +2751,7 @@
           <a:p>
             <a:fld id="{7C06B828-B815-F446-BC49-4CE521295E37}" type="datetimeFigureOut">
               <a:rPr lang="it-IT" smtClean="0"/>
-              <a:t>10/04/25</a:t>
+              <a:t>11/04/25</a:t>
             </a:fld>
             <a:endParaRPr lang="it-IT"/>
           </a:p>
@@ -2892,7 +2892,7 @@
           <a:p>
             <a:fld id="{7C06B828-B815-F446-BC49-4CE521295E37}" type="datetimeFigureOut">
               <a:rPr lang="it-IT" smtClean="0"/>
-              <a:t>10/04/25</a:t>
+              <a:t>11/04/25</a:t>
             </a:fld>
             <a:endParaRPr lang="it-IT"/>
           </a:p>
@@ -3005,7 +3005,7 @@
           <a:p>
             <a:fld id="{7C06B828-B815-F446-BC49-4CE521295E37}" type="datetimeFigureOut">
               <a:rPr lang="it-IT" smtClean="0"/>
-              <a:t>10/04/25</a:t>
+              <a:t>11/04/25</a:t>
             </a:fld>
             <a:endParaRPr lang="it-IT"/>
           </a:p>
@@ -3316,7 +3316,7 @@
           <a:p>
             <a:fld id="{7C06B828-B815-F446-BC49-4CE521295E37}" type="datetimeFigureOut">
               <a:rPr lang="it-IT" smtClean="0"/>
-              <a:t>10/04/25</a:t>
+              <a:t>11/04/25</a:t>
             </a:fld>
             <a:endParaRPr lang="it-IT"/>
           </a:p>
@@ -3604,7 +3604,7 @@
           <a:p>
             <a:fld id="{7C06B828-B815-F446-BC49-4CE521295E37}" type="datetimeFigureOut">
               <a:rPr lang="it-IT" smtClean="0"/>
-              <a:t>10/04/25</a:t>
+              <a:t>11/04/25</a:t>
             </a:fld>
             <a:endParaRPr lang="it-IT"/>
           </a:p>
@@ -3845,7 +3845,7 @@
           <a:p>
             <a:fld id="{7C06B828-B815-F446-BC49-4CE521295E37}" type="datetimeFigureOut">
               <a:rPr lang="it-IT" smtClean="0"/>
-              <a:t>10/04/25</a:t>
+              <a:t>11/04/25</a:t>
             </a:fld>
             <a:endParaRPr lang="it-IT"/>
           </a:p>
@@ -5477,16 +5477,7 @@
                 <a:effectLst/>
                 <a:latin typeface="-webkit-standard"/>
               </a:rPr>
-              <a:t>Dataset </a:t>
-            </a:r>
-            <a:r>
-              <a:rPr lang="it-CH" sz="4000" dirty="0">
-                <a:solidFill>
-                  <a:srgbClr val="FFFFFF"/>
-                </a:solidFill>
-                <a:latin typeface="-webkit-standard"/>
-              </a:rPr>
-              <a:t>refresh</a:t>
+              <a:t>Dataset</a:t>
             </a:r>
             <a:endParaRPr lang="it-IT" sz="4000" dirty="0">
               <a:solidFill>

</xml_diff>